<commit_message>
Update Ứng dụng quản lý loài.pptx
add data imgs
</commit_message>
<xml_diff>
--- a/documents/Ứng dụng quản lý loài.pptx
+++ b/documents/Ứng dụng quản lý loài.pptx
@@ -9,15 +9,17 @@
     <p:sldId id="257" r:id="rId3"/>
     <p:sldId id="262" r:id="rId4"/>
     <p:sldId id="260" r:id="rId5"/>
-    <p:sldId id="267" r:id="rId6"/>
-    <p:sldId id="264" r:id="rId7"/>
-    <p:sldId id="270" r:id="rId8"/>
-    <p:sldId id="271" r:id="rId9"/>
-    <p:sldId id="265" r:id="rId10"/>
-    <p:sldId id="266" r:id="rId11"/>
-    <p:sldId id="268" r:id="rId12"/>
-    <p:sldId id="269" r:id="rId13"/>
-    <p:sldId id="263" r:id="rId14"/>
+    <p:sldId id="274" r:id="rId6"/>
+    <p:sldId id="267" r:id="rId7"/>
+    <p:sldId id="275" r:id="rId8"/>
+    <p:sldId id="264" r:id="rId9"/>
+    <p:sldId id="270" r:id="rId10"/>
+    <p:sldId id="271" r:id="rId11"/>
+    <p:sldId id="265" r:id="rId12"/>
+    <p:sldId id="266" r:id="rId13"/>
+    <p:sldId id="268" r:id="rId14"/>
+    <p:sldId id="269" r:id="rId15"/>
+    <p:sldId id="263" r:id="rId16"/>
   </p:sldIdLst>
   <p:sldSz cx="12192000" cy="6858000"/>
   <p:notesSz cx="6858000" cy="9144000"/>
@@ -295,7 +297,7 @@
           <a:p>
             <a:fld id="{48A87A34-81AB-432B-8DAE-1953F412C126}" type="datetimeFigureOut">
               <a:rPr lang="en-US" dirty="0"/>
-              <a:t>5/19/2022</a:t>
+              <a:t>5/20/2022</a:t>
             </a:fld>
             <a:endParaRPr lang="en-US" dirty="0"/>
           </a:p>
@@ -602,7 +604,7 @@
           <a:p>
             <a:fld id="{48A87A34-81AB-432B-8DAE-1953F412C126}" type="datetimeFigureOut">
               <a:rPr lang="en-US" dirty="0"/>
-              <a:t>5/19/2022</a:t>
+              <a:t>5/20/2022</a:t>
             </a:fld>
             <a:endParaRPr lang="en-US" dirty="0"/>
           </a:p>
@@ -819,7 +821,7 @@
           <a:p>
             <a:fld id="{48A87A34-81AB-432B-8DAE-1953F412C126}" type="datetimeFigureOut">
               <a:rPr lang="en-US" dirty="0"/>
-              <a:t>5/19/2022</a:t>
+              <a:t>5/20/2022</a:t>
             </a:fld>
             <a:endParaRPr lang="en-US" dirty="0"/>
           </a:p>
@@ -1105,7 +1107,7 @@
           <a:p>
             <a:fld id="{48A87A34-81AB-432B-8DAE-1953F412C126}" type="datetimeFigureOut">
               <a:rPr lang="en-US" dirty="0"/>
-              <a:t>5/19/2022</a:t>
+              <a:t>5/20/2022</a:t>
             </a:fld>
             <a:endParaRPr lang="en-US" dirty="0"/>
           </a:p>
@@ -1554,7 +1556,7 @@
           <a:p>
             <a:fld id="{48A87A34-81AB-432B-8DAE-1953F412C126}" type="datetimeFigureOut">
               <a:rPr lang="en-US" dirty="0"/>
-              <a:t>5/19/2022</a:t>
+              <a:t>5/20/2022</a:t>
             </a:fld>
             <a:endParaRPr lang="en-US" dirty="0"/>
           </a:p>
@@ -2125,7 +2127,7 @@
           <a:p>
             <a:fld id="{48A87A34-81AB-432B-8DAE-1953F412C126}" type="datetimeFigureOut">
               <a:rPr lang="en-US" dirty="0"/>
-              <a:t>5/19/2022</a:t>
+              <a:t>5/20/2022</a:t>
             </a:fld>
             <a:endParaRPr lang="en-US" dirty="0"/>
           </a:p>
@@ -2972,7 +2974,7 @@
           <a:p>
             <a:fld id="{48A87A34-81AB-432B-8DAE-1953F412C126}" type="datetimeFigureOut">
               <a:rPr lang="en-US" dirty="0"/>
-              <a:t>5/19/2022</a:t>
+              <a:t>5/20/2022</a:t>
             </a:fld>
             <a:endParaRPr lang="en-US" dirty="0"/>
           </a:p>
@@ -3172,7 +3174,7 @@
           <a:p>
             <a:fld id="{48A87A34-81AB-432B-8DAE-1953F412C126}" type="datetimeFigureOut">
               <a:rPr lang="en-US" dirty="0"/>
-              <a:t>5/19/2022</a:t>
+              <a:t>5/20/2022</a:t>
             </a:fld>
             <a:endParaRPr lang="en-US" dirty="0"/>
           </a:p>
@@ -3381,7 +3383,7 @@
           <a:p>
             <a:fld id="{48A87A34-81AB-432B-8DAE-1953F412C126}" type="datetimeFigureOut">
               <a:rPr lang="en-US" dirty="0"/>
-              <a:t>5/19/2022</a:t>
+              <a:t>5/20/2022</a:t>
             </a:fld>
             <a:endParaRPr lang="en-US" dirty="0"/>
           </a:p>
@@ -3581,7 +3583,7 @@
           <a:p>
             <a:fld id="{48A87A34-81AB-432B-8DAE-1953F412C126}" type="datetimeFigureOut">
               <a:rPr lang="en-US" dirty="0"/>
-              <a:t>5/19/2022</a:t>
+              <a:t>5/20/2022</a:t>
             </a:fld>
             <a:endParaRPr lang="en-US" dirty="0"/>
           </a:p>
@@ -3856,7 +3858,7 @@
           <a:p>
             <a:fld id="{48A87A34-81AB-432B-8DAE-1953F412C126}" type="datetimeFigureOut">
               <a:rPr lang="en-US" dirty="0"/>
-              <a:t>5/19/2022</a:t>
+              <a:t>5/20/2022</a:t>
             </a:fld>
             <a:endParaRPr lang="en-US" dirty="0"/>
           </a:p>
@@ -4118,7 +4120,7 @@
           <a:p>
             <a:fld id="{48A87A34-81AB-432B-8DAE-1953F412C126}" type="datetimeFigureOut">
               <a:rPr lang="en-US" dirty="0"/>
-              <a:t>5/19/2022</a:t>
+              <a:t>5/20/2022</a:t>
             </a:fld>
             <a:endParaRPr lang="en-US" dirty="0"/>
           </a:p>
@@ -4528,7 +4530,7 @@
           <a:p>
             <a:fld id="{48A87A34-81AB-432B-8DAE-1953F412C126}" type="datetimeFigureOut">
               <a:rPr lang="en-US" dirty="0"/>
-              <a:t>5/19/2022</a:t>
+              <a:t>5/20/2022</a:t>
             </a:fld>
             <a:endParaRPr lang="en-US" dirty="0"/>
           </a:p>
@@ -4671,7 +4673,7 @@
           <a:p>
             <a:fld id="{48A87A34-81AB-432B-8DAE-1953F412C126}" type="datetimeFigureOut">
               <a:rPr lang="en-US" dirty="0"/>
-              <a:t>5/19/2022</a:t>
+              <a:t>5/20/2022</a:t>
             </a:fld>
             <a:endParaRPr lang="en-US" dirty="0"/>
           </a:p>
@@ -4791,7 +4793,7 @@
           <a:p>
             <a:fld id="{48A87A34-81AB-432B-8DAE-1953F412C126}" type="datetimeFigureOut">
               <a:rPr lang="en-US" dirty="0"/>
-              <a:t>5/19/2022</a:t>
+              <a:t>5/20/2022</a:t>
             </a:fld>
             <a:endParaRPr lang="en-US" dirty="0"/>
           </a:p>
@@ -5065,7 +5067,7 @@
           <a:p>
             <a:fld id="{48A87A34-81AB-432B-8DAE-1953F412C126}" type="datetimeFigureOut">
               <a:rPr lang="en-US" dirty="0"/>
-              <a:t>5/19/2022</a:t>
+              <a:t>5/20/2022</a:t>
             </a:fld>
             <a:endParaRPr lang="en-US" dirty="0"/>
           </a:p>
@@ -5372,7 +5374,7 @@
           <a:p>
             <a:fld id="{48A87A34-81AB-432B-8DAE-1953F412C126}" type="datetimeFigureOut">
               <a:rPr lang="en-US" dirty="0"/>
-              <a:t>5/19/2022</a:t>
+              <a:t>5/20/2022</a:t>
             </a:fld>
             <a:endParaRPr lang="en-US" dirty="0"/>
           </a:p>
@@ -5621,7 +5623,7 @@
             <a:fld id="{48A87A34-81AB-432B-8DAE-1953F412C126}" type="datetimeFigureOut">
               <a:rPr lang="en-US" dirty="0"/>
               <a:pPr/>
-              <a:t>5/19/2022</a:t>
+              <a:t>5/20/2022</a:t>
             </a:fld>
             <a:endParaRPr lang="en-US" dirty="0"/>
           </a:p>
@@ -6142,14 +6144,19 @@
             <p:ph type="title"/>
           </p:nvPr>
         </p:nvSpPr>
-        <p:spPr/>
+        <p:spPr>
+          <a:xfrm>
+            <a:off x="913773" y="416295"/>
+            <a:ext cx="10364451" cy="1227868"/>
+          </a:xfrm>
+        </p:spPr>
         <p:txBody>
           <a:bodyPr/>
           <a:lstStyle/>
           <a:p>
             <a:r>
               <a:rPr lang="en-US" dirty="0" smtClean="0"/>
-              <a:t>Logging Service</a:t>
+              <a:t>Command</a:t>
             </a:r>
             <a:endParaRPr lang="en-US" dirty="0"/>
           </a:p>
@@ -6179,15 +6186,15 @@
         </p:blipFill>
         <p:spPr>
           <a:xfrm>
-            <a:off x="1776046" y="2050440"/>
-            <a:ext cx="8809892" cy="4148137"/>
+            <a:off x="913772" y="1644163"/>
+            <a:ext cx="10364451" cy="4800599"/>
           </a:xfrm>
         </p:spPr>
       </p:pic>
     </p:spTree>
     <p:extLst>
       <p:ext uri="{BB962C8B-B14F-4D97-AF65-F5344CB8AC3E}">
-        <p14:creationId xmlns:p14="http://schemas.microsoft.com/office/powerpoint/2010/main" val="76581611"/>
+        <p14:creationId xmlns:p14="http://schemas.microsoft.com/office/powerpoint/2010/main" val="3698627744"/>
       </p:ext>
     </p:extLst>
   </p:cSld>
@@ -6233,8 +6240,8 @@
         </p:nvSpPr>
         <p:spPr>
           <a:xfrm>
-            <a:off x="913775" y="618518"/>
-            <a:ext cx="10364451" cy="1403714"/>
+            <a:off x="924032" y="952626"/>
+            <a:ext cx="10364451" cy="902552"/>
           </a:xfrm>
         </p:spPr>
         <p:txBody>
@@ -6243,7 +6250,7 @@
           <a:p>
             <a:r>
               <a:rPr lang="en-US" dirty="0" smtClean="0"/>
-              <a:t>Testing</a:t>
+              <a:t>Health Checks</a:t>
             </a:r>
             <a:endParaRPr lang="en-US" dirty="0"/>
           </a:p>
@@ -6273,15 +6280,15 @@
         </p:blipFill>
         <p:spPr>
           <a:xfrm>
-            <a:off x="1916722" y="1767254"/>
-            <a:ext cx="8616463" cy="4572000"/>
+            <a:off x="1626576" y="2092570"/>
+            <a:ext cx="8959362" cy="4264268"/>
           </a:xfrm>
         </p:spPr>
       </p:pic>
     </p:spTree>
     <p:extLst>
       <p:ext uri="{BB962C8B-B14F-4D97-AF65-F5344CB8AC3E}">
-        <p14:creationId xmlns:p14="http://schemas.microsoft.com/office/powerpoint/2010/main" val="2101875941"/>
+        <p14:creationId xmlns:p14="http://schemas.microsoft.com/office/powerpoint/2010/main" val="3076767217"/>
       </p:ext>
     </p:extLst>
   </p:cSld>
@@ -6332,6 +6339,189 @@
           <a:p>
             <a:r>
               <a:rPr lang="en-US" dirty="0" smtClean="0"/>
+              <a:t>Logging Service</a:t>
+            </a:r>
+            <a:endParaRPr lang="en-US" dirty="0"/>
+          </a:p>
+        </p:txBody>
+      </p:sp>
+      <p:pic>
+        <p:nvPicPr>
+          <p:cNvPr id="4" name="Content Placeholder 3"/>
+          <p:cNvPicPr>
+            <a:picLocks noGrp="1" noChangeAspect="1"/>
+          </p:cNvPicPr>
+          <p:nvPr>
+            <p:ph sz="quarter" idx="13"/>
+          </p:nvPr>
+        </p:nvPicPr>
+        <p:blipFill>
+          <a:blip r:embed="rId2">
+            <a:extLst>
+              <a:ext uri="{28A0092B-C50C-407E-A947-70E740481C1C}">
+                <a14:useLocalDpi xmlns:a14="http://schemas.microsoft.com/office/drawing/2010/main" val="0"/>
+              </a:ext>
+            </a:extLst>
+          </a:blip>
+          <a:stretch>
+            <a:fillRect/>
+          </a:stretch>
+        </p:blipFill>
+        <p:spPr>
+          <a:xfrm>
+            <a:off x="1776046" y="2050440"/>
+            <a:ext cx="8809892" cy="4148137"/>
+          </a:xfrm>
+        </p:spPr>
+      </p:pic>
+    </p:spTree>
+    <p:extLst>
+      <p:ext uri="{BB962C8B-B14F-4D97-AF65-F5344CB8AC3E}">
+        <p14:creationId xmlns:p14="http://schemas.microsoft.com/office/powerpoint/2010/main" val="76581611"/>
+      </p:ext>
+    </p:extLst>
+  </p:cSld>
+  <p:clrMapOvr>
+    <a:masterClrMapping/>
+  </p:clrMapOvr>
+  <p:timing>
+    <p:tnLst>
+      <p:par>
+        <p:cTn id="1" dur="indefinite" restart="never" nodeType="tmRoot"/>
+      </p:par>
+    </p:tnLst>
+  </p:timing>
+</p:sld>
+</file>
+
+<file path=ppt/slides/slide13.xml><?xml version="1.0" encoding="utf-8"?>
+<p:sld xmlns:a="http://schemas.openxmlformats.org/drawingml/2006/main" xmlns:r="http://schemas.openxmlformats.org/officeDocument/2006/relationships" xmlns:p="http://schemas.openxmlformats.org/presentationml/2006/main">
+  <p:cSld>
+    <p:spTree>
+      <p:nvGrpSpPr>
+        <p:cNvPr id="1" name=""/>
+        <p:cNvGrpSpPr/>
+        <p:nvPr/>
+      </p:nvGrpSpPr>
+      <p:grpSpPr>
+        <a:xfrm>
+          <a:off x="0" y="0"/>
+          <a:ext cx="0" cy="0"/>
+          <a:chOff x="0" y="0"/>
+          <a:chExt cx="0" cy="0"/>
+        </a:xfrm>
+      </p:grpSpPr>
+      <p:sp>
+        <p:nvSpPr>
+          <p:cNvPr id="2" name="Title 1"/>
+          <p:cNvSpPr>
+            <a:spLocks noGrp="1"/>
+          </p:cNvSpPr>
+          <p:nvPr>
+            <p:ph type="title"/>
+          </p:nvPr>
+        </p:nvSpPr>
+        <p:spPr>
+          <a:xfrm>
+            <a:off x="913775" y="618518"/>
+            <a:ext cx="10364451" cy="1403714"/>
+          </a:xfrm>
+        </p:spPr>
+        <p:txBody>
+          <a:bodyPr/>
+          <a:lstStyle/>
+          <a:p>
+            <a:r>
+              <a:rPr lang="en-US" dirty="0" smtClean="0"/>
+              <a:t>Testing</a:t>
+            </a:r>
+            <a:endParaRPr lang="en-US" dirty="0"/>
+          </a:p>
+        </p:txBody>
+      </p:sp>
+      <p:pic>
+        <p:nvPicPr>
+          <p:cNvPr id="4" name="Content Placeholder 3"/>
+          <p:cNvPicPr>
+            <a:picLocks noGrp="1" noChangeAspect="1"/>
+          </p:cNvPicPr>
+          <p:nvPr>
+            <p:ph sz="quarter" idx="13"/>
+          </p:nvPr>
+        </p:nvPicPr>
+        <p:blipFill>
+          <a:blip r:embed="rId2">
+            <a:extLst>
+              <a:ext uri="{28A0092B-C50C-407E-A947-70E740481C1C}">
+                <a14:useLocalDpi xmlns:a14="http://schemas.microsoft.com/office/drawing/2010/main" val="0"/>
+              </a:ext>
+            </a:extLst>
+          </a:blip>
+          <a:stretch>
+            <a:fillRect/>
+          </a:stretch>
+        </p:blipFill>
+        <p:spPr>
+          <a:xfrm>
+            <a:off x="1916722" y="1767254"/>
+            <a:ext cx="8616463" cy="4572000"/>
+          </a:xfrm>
+        </p:spPr>
+      </p:pic>
+    </p:spTree>
+    <p:extLst>
+      <p:ext uri="{BB962C8B-B14F-4D97-AF65-F5344CB8AC3E}">
+        <p14:creationId xmlns:p14="http://schemas.microsoft.com/office/powerpoint/2010/main" val="2101875941"/>
+      </p:ext>
+    </p:extLst>
+  </p:cSld>
+  <p:clrMapOvr>
+    <a:masterClrMapping/>
+  </p:clrMapOvr>
+  <p:timing>
+    <p:tnLst>
+      <p:par>
+        <p:cTn id="1" dur="indefinite" restart="never" nodeType="tmRoot"/>
+      </p:par>
+    </p:tnLst>
+  </p:timing>
+</p:sld>
+</file>
+
+<file path=ppt/slides/slide14.xml><?xml version="1.0" encoding="utf-8"?>
+<p:sld xmlns:a="http://schemas.openxmlformats.org/drawingml/2006/main" xmlns:r="http://schemas.openxmlformats.org/officeDocument/2006/relationships" xmlns:p="http://schemas.openxmlformats.org/presentationml/2006/main">
+  <p:cSld>
+    <p:spTree>
+      <p:nvGrpSpPr>
+        <p:cNvPr id="1" name=""/>
+        <p:cNvGrpSpPr/>
+        <p:nvPr/>
+      </p:nvGrpSpPr>
+      <p:grpSpPr>
+        <a:xfrm>
+          <a:off x="0" y="0"/>
+          <a:ext cx="0" cy="0"/>
+          <a:chOff x="0" y="0"/>
+          <a:chExt cx="0" cy="0"/>
+        </a:xfrm>
+      </p:grpSpPr>
+      <p:sp>
+        <p:nvSpPr>
+          <p:cNvPr id="2" name="Title 1"/>
+          <p:cNvSpPr>
+            <a:spLocks noGrp="1"/>
+          </p:cNvSpPr>
+          <p:nvPr>
+            <p:ph type="title"/>
+          </p:nvPr>
+        </p:nvSpPr>
+        <p:spPr/>
+        <p:txBody>
+          <a:bodyPr/>
+          <a:lstStyle/>
+          <a:p>
+            <a:r>
+              <a:rPr lang="en-US" dirty="0" smtClean="0"/>
               <a:t>Unit testing</a:t>
             </a:r>
             <a:endParaRPr lang="en-US" dirty="0"/>
@@ -6387,7 +6577,7 @@
 </p:sld>
 </file>
 
-<file path=ppt/slides/slide13.xml><?xml version="1.0" encoding="utf-8"?>
+<file path=ppt/slides/slide15.xml><?xml version="1.0" encoding="utf-8"?>
 <p:sld xmlns:a="http://schemas.openxmlformats.org/drawingml/2006/main" xmlns:r="http://schemas.openxmlformats.org/officeDocument/2006/relationships" xmlns:p="http://schemas.openxmlformats.org/presentationml/2006/main">
   <p:cSld>
     <p:spTree>
@@ -6778,7 +6968,7 @@
           <a:p>
             <a:r>
               <a:rPr lang="en-US" dirty="0" smtClean="0"/>
-              <a:t>Organism service</a:t>
+              <a:t>Identity Data</a:t>
             </a:r>
             <a:endParaRPr lang="en-US" dirty="0"/>
           </a:p>
@@ -6808,15 +6998,15 @@
         </p:blipFill>
         <p:spPr>
           <a:xfrm>
-            <a:off x="844062" y="1995854"/>
-            <a:ext cx="10533184" cy="4463692"/>
+            <a:off x="913774" y="1828800"/>
+            <a:ext cx="10364452" cy="4220307"/>
           </a:xfrm>
         </p:spPr>
       </p:pic>
     </p:spTree>
     <p:extLst>
       <p:ext uri="{BB962C8B-B14F-4D97-AF65-F5344CB8AC3E}">
-        <p14:creationId xmlns:p14="http://schemas.microsoft.com/office/powerpoint/2010/main" val="609780617"/>
+        <p14:creationId xmlns:p14="http://schemas.microsoft.com/office/powerpoint/2010/main" val="3307835507"/>
       </p:ext>
     </p:extLst>
   </p:cSld>
@@ -6867,7 +7057,7 @@
           <a:p>
             <a:r>
               <a:rPr lang="en-US" dirty="0" smtClean="0"/>
-              <a:t>Message Queue</a:t>
+              <a:t>Organism service</a:t>
             </a:r>
             <a:endParaRPr lang="en-US" dirty="0"/>
           </a:p>
@@ -6897,15 +7087,15 @@
         </p:blipFill>
         <p:spPr>
           <a:xfrm>
-            <a:off x="913775" y="1925516"/>
-            <a:ext cx="10364452" cy="4334608"/>
+            <a:off x="844062" y="1995854"/>
+            <a:ext cx="10533184" cy="4463692"/>
           </a:xfrm>
         </p:spPr>
       </p:pic>
     </p:spTree>
     <p:extLst>
       <p:ext uri="{BB962C8B-B14F-4D97-AF65-F5344CB8AC3E}">
-        <p14:creationId xmlns:p14="http://schemas.microsoft.com/office/powerpoint/2010/main" val="1945989115"/>
+        <p14:creationId xmlns:p14="http://schemas.microsoft.com/office/powerpoint/2010/main" val="609780617"/>
       </p:ext>
     </p:extLst>
   </p:cSld>
@@ -6949,19 +7139,14 @@
             <p:ph type="title"/>
           </p:nvPr>
         </p:nvSpPr>
-        <p:spPr>
-          <a:xfrm>
-            <a:off x="913775" y="618518"/>
-            <a:ext cx="10364451" cy="1078398"/>
-          </a:xfrm>
-        </p:spPr>
-        <p:txBody>
-          <a:bodyPr/>
-          <a:lstStyle/>
-          <a:p>
-            <a:r>
-              <a:rPr lang="en-US" smtClean="0"/>
-              <a:t>Event</a:t>
+        <p:spPr/>
+        <p:txBody>
+          <a:bodyPr/>
+          <a:lstStyle/>
+          <a:p>
+            <a:r>
+              <a:rPr lang="en-US" dirty="0" smtClean="0"/>
+              <a:t>Organism Data</a:t>
             </a:r>
             <a:endParaRPr lang="en-US" dirty="0"/>
           </a:p>
@@ -6991,28 +7176,51 @@
         </p:blipFill>
         <p:spPr>
           <a:xfrm>
-            <a:off x="931358" y="1547446"/>
-            <a:ext cx="10364451" cy="5020409"/>
-          </a:xfrm>
+            <a:off x="474785" y="1821949"/>
+            <a:ext cx="6749477" cy="4332666"/>
+          </a:xfrm>
+        </p:spPr>
+      </p:pic>
+      <p:pic>
+        <p:nvPicPr>
+          <p:cNvPr id="5" name="Picture 4"/>
+          <p:cNvPicPr>
+            <a:picLocks noChangeAspect="1"/>
+          </p:cNvPicPr>
+          <p:nvPr/>
+        </p:nvPicPr>
+        <p:blipFill>
+          <a:blip r:embed="rId3">
+            <a:extLst>
+              <a:ext uri="{28A0092B-C50C-407E-A947-70E740481C1C}">
+                <a14:useLocalDpi xmlns:a14="http://schemas.microsoft.com/office/drawing/2010/main" val="0"/>
+              </a:ext>
+            </a:extLst>
+          </a:blip>
+          <a:stretch>
+            <a:fillRect/>
+          </a:stretch>
+        </p:blipFill>
+        <p:spPr>
+          <a:xfrm>
+            <a:off x="7874977" y="1821949"/>
+            <a:ext cx="3842239" cy="2530243"/>
+          </a:xfrm>
+          <a:prstGeom prst="rect">
+            <a:avLst/>
+          </a:prstGeom>
         </p:spPr>
       </p:pic>
     </p:spTree>
     <p:extLst>
       <p:ext uri="{BB962C8B-B14F-4D97-AF65-F5344CB8AC3E}">
-        <p14:creationId xmlns:p14="http://schemas.microsoft.com/office/powerpoint/2010/main" val="1915393501"/>
+        <p14:creationId xmlns:p14="http://schemas.microsoft.com/office/powerpoint/2010/main" val="1372667010"/>
       </p:ext>
     </p:extLst>
   </p:cSld>
   <p:clrMapOvr>
     <a:masterClrMapping/>
   </p:clrMapOvr>
-  <p:timing>
-    <p:tnLst>
-      <p:par>
-        <p:cTn id="1" dur="indefinite" restart="never" nodeType="tmRoot"/>
-      </p:par>
-    </p:tnLst>
-  </p:timing>
 </p:sld>
 </file>
 
@@ -7043,19 +7251,14 @@
             <p:ph type="title"/>
           </p:nvPr>
         </p:nvSpPr>
-        <p:spPr>
-          <a:xfrm>
-            <a:off x="913773" y="416295"/>
-            <a:ext cx="10364451" cy="1227868"/>
-          </a:xfrm>
-        </p:spPr>
+        <p:spPr/>
         <p:txBody>
           <a:bodyPr/>
           <a:lstStyle/>
           <a:p>
             <a:r>
               <a:rPr lang="en-US" dirty="0" smtClean="0"/>
-              <a:t>Command</a:t>
+              <a:t>Message Queue</a:t>
             </a:r>
             <a:endParaRPr lang="en-US" dirty="0"/>
           </a:p>
@@ -7085,15 +7288,15 @@
         </p:blipFill>
         <p:spPr>
           <a:xfrm>
-            <a:off x="913772" y="1644163"/>
-            <a:ext cx="10364451" cy="4800599"/>
+            <a:off x="913775" y="1925516"/>
+            <a:ext cx="10364452" cy="4334608"/>
           </a:xfrm>
         </p:spPr>
       </p:pic>
     </p:spTree>
     <p:extLst>
       <p:ext uri="{BB962C8B-B14F-4D97-AF65-F5344CB8AC3E}">
-        <p14:creationId xmlns:p14="http://schemas.microsoft.com/office/powerpoint/2010/main" val="3698627744"/>
+        <p14:creationId xmlns:p14="http://schemas.microsoft.com/office/powerpoint/2010/main" val="1945989115"/>
       </p:ext>
     </p:extLst>
   </p:cSld>
@@ -7139,17 +7342,17 @@
         </p:nvSpPr>
         <p:spPr>
           <a:xfrm>
-            <a:off x="924032" y="952626"/>
-            <a:ext cx="10364451" cy="902552"/>
-          </a:xfrm>
-        </p:spPr>
-        <p:txBody>
-          <a:bodyPr/>
-          <a:lstStyle/>
-          <a:p>
-            <a:r>
-              <a:rPr lang="en-US" dirty="0" smtClean="0"/>
-              <a:t>Health Checks</a:t>
+            <a:off x="913775" y="618518"/>
+            <a:ext cx="10364451" cy="1078398"/>
+          </a:xfrm>
+        </p:spPr>
+        <p:txBody>
+          <a:bodyPr/>
+          <a:lstStyle/>
+          <a:p>
+            <a:r>
+              <a:rPr lang="en-US" smtClean="0"/>
+              <a:t>Event</a:t>
             </a:r>
             <a:endParaRPr lang="en-US" dirty="0"/>
           </a:p>
@@ -7179,15 +7382,15 @@
         </p:blipFill>
         <p:spPr>
           <a:xfrm>
-            <a:off x="1626576" y="2092570"/>
-            <a:ext cx="8959362" cy="4264268"/>
+            <a:off x="931358" y="1547446"/>
+            <a:ext cx="10364451" cy="5020409"/>
           </a:xfrm>
         </p:spPr>
       </p:pic>
     </p:spTree>
     <p:extLst>
       <p:ext uri="{BB962C8B-B14F-4D97-AF65-F5344CB8AC3E}">
-        <p14:creationId xmlns:p14="http://schemas.microsoft.com/office/powerpoint/2010/main" val="3076767217"/>
+        <p14:creationId xmlns:p14="http://schemas.microsoft.com/office/powerpoint/2010/main" val="1915393501"/>
       </p:ext>
     </p:extLst>
   </p:cSld>

</xml_diff>

<commit_message>
update organism class diagram
</commit_message>
<xml_diff>
--- a/documents/Ứng dụng quản lý loài.pptx
+++ b/documents/Ứng dụng quản lý loài.pptx
@@ -297,7 +297,7 @@
           <a:p>
             <a:fld id="{48A87A34-81AB-432B-8DAE-1953F412C126}" type="datetimeFigureOut">
               <a:rPr lang="en-US" dirty="0"/>
-              <a:t>5/20/2022</a:t>
+              <a:t>5/21/2022</a:t>
             </a:fld>
             <a:endParaRPr lang="en-US" dirty="0"/>
           </a:p>
@@ -604,7 +604,7 @@
           <a:p>
             <a:fld id="{48A87A34-81AB-432B-8DAE-1953F412C126}" type="datetimeFigureOut">
               <a:rPr lang="en-US" dirty="0"/>
-              <a:t>5/20/2022</a:t>
+              <a:t>5/21/2022</a:t>
             </a:fld>
             <a:endParaRPr lang="en-US" dirty="0"/>
           </a:p>
@@ -821,7 +821,7 @@
           <a:p>
             <a:fld id="{48A87A34-81AB-432B-8DAE-1953F412C126}" type="datetimeFigureOut">
               <a:rPr lang="en-US" dirty="0"/>
-              <a:t>5/20/2022</a:t>
+              <a:t>5/21/2022</a:t>
             </a:fld>
             <a:endParaRPr lang="en-US" dirty="0"/>
           </a:p>
@@ -1107,7 +1107,7 @@
           <a:p>
             <a:fld id="{48A87A34-81AB-432B-8DAE-1953F412C126}" type="datetimeFigureOut">
               <a:rPr lang="en-US" dirty="0"/>
-              <a:t>5/20/2022</a:t>
+              <a:t>5/21/2022</a:t>
             </a:fld>
             <a:endParaRPr lang="en-US" dirty="0"/>
           </a:p>
@@ -1556,7 +1556,7 @@
           <a:p>
             <a:fld id="{48A87A34-81AB-432B-8DAE-1953F412C126}" type="datetimeFigureOut">
               <a:rPr lang="en-US" dirty="0"/>
-              <a:t>5/20/2022</a:t>
+              <a:t>5/21/2022</a:t>
             </a:fld>
             <a:endParaRPr lang="en-US" dirty="0"/>
           </a:p>
@@ -2127,7 +2127,7 @@
           <a:p>
             <a:fld id="{48A87A34-81AB-432B-8DAE-1953F412C126}" type="datetimeFigureOut">
               <a:rPr lang="en-US" dirty="0"/>
-              <a:t>5/20/2022</a:t>
+              <a:t>5/21/2022</a:t>
             </a:fld>
             <a:endParaRPr lang="en-US" dirty="0"/>
           </a:p>
@@ -2974,7 +2974,7 @@
           <a:p>
             <a:fld id="{48A87A34-81AB-432B-8DAE-1953F412C126}" type="datetimeFigureOut">
               <a:rPr lang="en-US" dirty="0"/>
-              <a:t>5/20/2022</a:t>
+              <a:t>5/21/2022</a:t>
             </a:fld>
             <a:endParaRPr lang="en-US" dirty="0"/>
           </a:p>
@@ -3174,7 +3174,7 @@
           <a:p>
             <a:fld id="{48A87A34-81AB-432B-8DAE-1953F412C126}" type="datetimeFigureOut">
               <a:rPr lang="en-US" dirty="0"/>
-              <a:t>5/20/2022</a:t>
+              <a:t>5/21/2022</a:t>
             </a:fld>
             <a:endParaRPr lang="en-US" dirty="0"/>
           </a:p>
@@ -3383,7 +3383,7 @@
           <a:p>
             <a:fld id="{48A87A34-81AB-432B-8DAE-1953F412C126}" type="datetimeFigureOut">
               <a:rPr lang="en-US" dirty="0"/>
-              <a:t>5/20/2022</a:t>
+              <a:t>5/21/2022</a:t>
             </a:fld>
             <a:endParaRPr lang="en-US" dirty="0"/>
           </a:p>
@@ -3583,7 +3583,7 @@
           <a:p>
             <a:fld id="{48A87A34-81AB-432B-8DAE-1953F412C126}" type="datetimeFigureOut">
               <a:rPr lang="en-US" dirty="0"/>
-              <a:t>5/20/2022</a:t>
+              <a:t>5/21/2022</a:t>
             </a:fld>
             <a:endParaRPr lang="en-US" dirty="0"/>
           </a:p>
@@ -3858,7 +3858,7 @@
           <a:p>
             <a:fld id="{48A87A34-81AB-432B-8DAE-1953F412C126}" type="datetimeFigureOut">
               <a:rPr lang="en-US" dirty="0"/>
-              <a:t>5/20/2022</a:t>
+              <a:t>5/21/2022</a:t>
             </a:fld>
             <a:endParaRPr lang="en-US" dirty="0"/>
           </a:p>
@@ -4120,7 +4120,7 @@
           <a:p>
             <a:fld id="{48A87A34-81AB-432B-8DAE-1953F412C126}" type="datetimeFigureOut">
               <a:rPr lang="en-US" dirty="0"/>
-              <a:t>5/20/2022</a:t>
+              <a:t>5/21/2022</a:t>
             </a:fld>
             <a:endParaRPr lang="en-US" dirty="0"/>
           </a:p>
@@ -4530,7 +4530,7 @@
           <a:p>
             <a:fld id="{48A87A34-81AB-432B-8DAE-1953F412C126}" type="datetimeFigureOut">
               <a:rPr lang="en-US" dirty="0"/>
-              <a:t>5/20/2022</a:t>
+              <a:t>5/21/2022</a:t>
             </a:fld>
             <a:endParaRPr lang="en-US" dirty="0"/>
           </a:p>
@@ -4673,7 +4673,7 @@
           <a:p>
             <a:fld id="{48A87A34-81AB-432B-8DAE-1953F412C126}" type="datetimeFigureOut">
               <a:rPr lang="en-US" dirty="0"/>
-              <a:t>5/20/2022</a:t>
+              <a:t>5/21/2022</a:t>
             </a:fld>
             <a:endParaRPr lang="en-US" dirty="0"/>
           </a:p>
@@ -4793,7 +4793,7 @@
           <a:p>
             <a:fld id="{48A87A34-81AB-432B-8DAE-1953F412C126}" type="datetimeFigureOut">
               <a:rPr lang="en-US" dirty="0"/>
-              <a:t>5/20/2022</a:t>
+              <a:t>5/21/2022</a:t>
             </a:fld>
             <a:endParaRPr lang="en-US" dirty="0"/>
           </a:p>
@@ -5067,7 +5067,7 @@
           <a:p>
             <a:fld id="{48A87A34-81AB-432B-8DAE-1953F412C126}" type="datetimeFigureOut">
               <a:rPr lang="en-US" dirty="0"/>
-              <a:t>5/20/2022</a:t>
+              <a:t>5/21/2022</a:t>
             </a:fld>
             <a:endParaRPr lang="en-US" dirty="0"/>
           </a:p>
@@ -5374,7 +5374,7 @@
           <a:p>
             <a:fld id="{48A87A34-81AB-432B-8DAE-1953F412C126}" type="datetimeFigureOut">
               <a:rPr lang="en-US" dirty="0"/>
-              <a:t>5/20/2022</a:t>
+              <a:t>5/21/2022</a:t>
             </a:fld>
             <a:endParaRPr lang="en-US" dirty="0"/>
           </a:p>
@@ -5623,7 +5623,7 @@
             <a:fld id="{48A87A34-81AB-432B-8DAE-1953F412C126}" type="datetimeFigureOut">
               <a:rPr lang="en-US" dirty="0"/>
               <a:pPr/>
-              <a:t>5/20/2022</a:t>
+              <a:t>5/21/2022</a:t>
             </a:fld>
             <a:endParaRPr lang="en-US" dirty="0"/>
           </a:p>
@@ -7176,8 +7176,8 @@
         </p:blipFill>
         <p:spPr>
           <a:xfrm>
-            <a:off x="474785" y="1821949"/>
-            <a:ext cx="6749477" cy="4332666"/>
+            <a:off x="662999" y="1821949"/>
+            <a:ext cx="6373049" cy="4332666"/>
           </a:xfrm>
         </p:spPr>
       </p:pic>

</xml_diff>